<commit_message>
just added the small content
</commit_message>
<xml_diff>
--- a/Designs/Phase1DesignsAndFlow.pptx
+++ b/Designs/Phase1DesignsAndFlow.pptx
@@ -104,6 +104,11 @@
       </a:defRPr>
     </a:lvl9pPr>
   </p:defaultTextStyle>
+  <p:extLst>
+    <p:ext uri="{EFAFB233-063F-42B5-8137-9DF3F51BA10A}">
+      <p15:sldGuideLst xmlns:p15="http://schemas.microsoft.com/office/powerpoint/2012/main"/>
+    </p:ext>
+  </p:extLst>
 </p:presentation>
 </file>
 
@@ -238,7 +243,7 @@
           <a:p>
             <a:fld id="{201D443E-6A9A-46D5-85CB-D4CA8A583528}" type="datetimeFigureOut">
               <a:rPr lang="en-IN" smtClean="0"/>
-              <a:t>06-03-2021</a:t>
+              <a:t>11-03-2021</a:t>
             </a:fld>
             <a:endParaRPr lang="en-IN"/>
           </a:p>
@@ -408,7 +413,7 @@
           <a:p>
             <a:fld id="{201D443E-6A9A-46D5-85CB-D4CA8A583528}" type="datetimeFigureOut">
               <a:rPr lang="en-IN" smtClean="0"/>
-              <a:t>06-03-2021</a:t>
+              <a:t>11-03-2021</a:t>
             </a:fld>
             <a:endParaRPr lang="en-IN"/>
           </a:p>
@@ -588,7 +593,7 @@
           <a:p>
             <a:fld id="{201D443E-6A9A-46D5-85CB-D4CA8A583528}" type="datetimeFigureOut">
               <a:rPr lang="en-IN" smtClean="0"/>
-              <a:t>06-03-2021</a:t>
+              <a:t>11-03-2021</a:t>
             </a:fld>
             <a:endParaRPr lang="en-IN"/>
           </a:p>
@@ -758,7 +763,7 @@
           <a:p>
             <a:fld id="{201D443E-6A9A-46D5-85CB-D4CA8A583528}" type="datetimeFigureOut">
               <a:rPr lang="en-IN" smtClean="0"/>
-              <a:t>06-03-2021</a:t>
+              <a:t>11-03-2021</a:t>
             </a:fld>
             <a:endParaRPr lang="en-IN"/>
           </a:p>
@@ -1002,7 +1007,7 @@
           <a:p>
             <a:fld id="{201D443E-6A9A-46D5-85CB-D4CA8A583528}" type="datetimeFigureOut">
               <a:rPr lang="en-IN" smtClean="0"/>
-              <a:t>06-03-2021</a:t>
+              <a:t>11-03-2021</a:t>
             </a:fld>
             <a:endParaRPr lang="en-IN"/>
           </a:p>
@@ -1234,7 +1239,7 @@
           <a:p>
             <a:fld id="{201D443E-6A9A-46D5-85CB-D4CA8A583528}" type="datetimeFigureOut">
               <a:rPr lang="en-IN" smtClean="0"/>
-              <a:t>06-03-2021</a:t>
+              <a:t>11-03-2021</a:t>
             </a:fld>
             <a:endParaRPr lang="en-IN"/>
           </a:p>
@@ -1601,7 +1606,7 @@
           <a:p>
             <a:fld id="{201D443E-6A9A-46D5-85CB-D4CA8A583528}" type="datetimeFigureOut">
               <a:rPr lang="en-IN" smtClean="0"/>
-              <a:t>06-03-2021</a:t>
+              <a:t>11-03-2021</a:t>
             </a:fld>
             <a:endParaRPr lang="en-IN"/>
           </a:p>
@@ -1719,7 +1724,7 @@
           <a:p>
             <a:fld id="{201D443E-6A9A-46D5-85CB-D4CA8A583528}" type="datetimeFigureOut">
               <a:rPr lang="en-IN" smtClean="0"/>
-              <a:t>06-03-2021</a:t>
+              <a:t>11-03-2021</a:t>
             </a:fld>
             <a:endParaRPr lang="en-IN"/>
           </a:p>
@@ -1814,7 +1819,7 @@
           <a:p>
             <a:fld id="{201D443E-6A9A-46D5-85CB-D4CA8A583528}" type="datetimeFigureOut">
               <a:rPr lang="en-IN" smtClean="0"/>
-              <a:t>06-03-2021</a:t>
+              <a:t>11-03-2021</a:t>
             </a:fld>
             <a:endParaRPr lang="en-IN"/>
           </a:p>
@@ -2091,7 +2096,7 @@
           <a:p>
             <a:fld id="{201D443E-6A9A-46D5-85CB-D4CA8A583528}" type="datetimeFigureOut">
               <a:rPr lang="en-IN" smtClean="0"/>
-              <a:t>06-03-2021</a:t>
+              <a:t>11-03-2021</a:t>
             </a:fld>
             <a:endParaRPr lang="en-IN"/>
           </a:p>
@@ -2348,7 +2353,7 @@
           <a:p>
             <a:fld id="{201D443E-6A9A-46D5-85CB-D4CA8A583528}" type="datetimeFigureOut">
               <a:rPr lang="en-IN" smtClean="0"/>
-              <a:t>06-03-2021</a:t>
+              <a:t>11-03-2021</a:t>
             </a:fld>
             <a:endParaRPr lang="en-IN"/>
           </a:p>
@@ -2561,7 +2566,7 @@
           <a:p>
             <a:fld id="{201D443E-6A9A-46D5-85CB-D4CA8A583528}" type="datetimeFigureOut">
               <a:rPr lang="en-IN" smtClean="0"/>
-              <a:t>06-03-2021</a:t>
+              <a:t>11-03-2021</a:t>
             </a:fld>
             <a:endParaRPr lang="en-IN"/>
           </a:p>
@@ -2980,7 +2985,7 @@
         </p:nvSpPr>
         <p:spPr>
           <a:xfrm>
-            <a:off x="1828800" y="1730829"/>
+            <a:off x="2115405" y="1730829"/>
             <a:ext cx="5355771" cy="7739742"/>
           </a:xfrm>
           <a:prstGeom prst="rect">
@@ -3109,6 +3114,152 @@
           </a:fontRef>
         </p:style>
       </p:cxnSp>
+      <p:sp>
+        <p:nvSpPr>
+          <p:cNvPr id="2" name="Oval 1">
+            <a:extLst>
+              <a:ext uri="{FF2B5EF4-FFF2-40B4-BE49-F238E27FC236}">
+                <a16:creationId xmlns:a16="http://schemas.microsoft.com/office/drawing/2014/main" id="{21BB5674-8EDC-43A6-AF5D-918961BE0100}"/>
+              </a:ext>
+            </a:extLst>
+          </p:cNvPr>
+          <p:cNvSpPr/>
+          <p:nvPr/>
+        </p:nvSpPr>
+        <p:spPr>
+          <a:xfrm>
+            <a:off x="2388349" y="2715905"/>
+            <a:ext cx="1419860" cy="914400"/>
+          </a:xfrm>
+          <a:prstGeom prst="ellipse">
+            <a:avLst/>
+          </a:prstGeom>
+        </p:spPr>
+        <p:style>
+          <a:lnRef idx="2">
+            <a:schemeClr val="accent6"/>
+          </a:lnRef>
+          <a:fillRef idx="1">
+            <a:schemeClr val="lt1"/>
+          </a:fillRef>
+          <a:effectRef idx="0">
+            <a:schemeClr val="accent6"/>
+          </a:effectRef>
+          <a:fontRef idx="minor">
+            <a:schemeClr val="dk1"/>
+          </a:fontRef>
+        </p:style>
+        <p:txBody>
+          <a:bodyPr rtlCol="0" anchor="ctr"/>
+          <a:lstStyle/>
+          <a:p>
+            <a:pPr algn="ctr"/>
+            <a:r>
+              <a:rPr lang="en-IN" dirty="0">
+                <a:solidFill>
+                  <a:srgbClr val="92D050"/>
+                </a:solidFill>
+                <a:highlight>
+                  <a:srgbClr val="FFFF00"/>
+                </a:highlight>
+              </a:rPr>
+              <a:t>Chat</a:t>
+            </a:r>
+          </a:p>
+        </p:txBody>
+      </p:sp>
+      <p:sp>
+        <p:nvSpPr>
+          <p:cNvPr id="6" name="Oval 5">
+            <a:extLst>
+              <a:ext uri="{FF2B5EF4-FFF2-40B4-BE49-F238E27FC236}">
+                <a16:creationId xmlns:a16="http://schemas.microsoft.com/office/drawing/2014/main" id="{E2975E14-E471-4BB1-9322-BE5E2F0B692F}"/>
+              </a:ext>
+            </a:extLst>
+          </p:cNvPr>
+          <p:cNvSpPr/>
+          <p:nvPr/>
+        </p:nvSpPr>
+        <p:spPr>
+          <a:xfrm>
+            <a:off x="4084736" y="2715905"/>
+            <a:ext cx="1386713" cy="914400"/>
+          </a:xfrm>
+          <a:prstGeom prst="ellipse">
+            <a:avLst/>
+          </a:prstGeom>
+        </p:spPr>
+        <p:style>
+          <a:lnRef idx="2">
+            <a:schemeClr val="accent1">
+              <a:shade val="50000"/>
+            </a:schemeClr>
+          </a:lnRef>
+          <a:fillRef idx="1">
+            <a:schemeClr val="accent1"/>
+          </a:fillRef>
+          <a:effectRef idx="0">
+            <a:schemeClr val="accent1"/>
+          </a:effectRef>
+          <a:fontRef idx="minor">
+            <a:schemeClr val="lt1"/>
+          </a:fontRef>
+        </p:style>
+        <p:txBody>
+          <a:bodyPr rtlCol="0" anchor="ctr"/>
+          <a:lstStyle/>
+          <a:p>
+            <a:pPr algn="ctr"/>
+            <a:endParaRPr lang="en-IN" dirty="0"/>
+          </a:p>
+        </p:txBody>
+      </p:sp>
+      <p:sp>
+        <p:nvSpPr>
+          <p:cNvPr id="8" name="Oval 7">
+            <a:extLst>
+              <a:ext uri="{FF2B5EF4-FFF2-40B4-BE49-F238E27FC236}">
+                <a16:creationId xmlns:a16="http://schemas.microsoft.com/office/drawing/2014/main" id="{C18B148E-766A-44FF-9EEC-EB85CB606334}"/>
+              </a:ext>
+            </a:extLst>
+          </p:cNvPr>
+          <p:cNvSpPr/>
+          <p:nvPr/>
+        </p:nvSpPr>
+        <p:spPr>
+          <a:xfrm>
+            <a:off x="5747976" y="2704529"/>
+            <a:ext cx="1351136" cy="914400"/>
+          </a:xfrm>
+          <a:prstGeom prst="ellipse">
+            <a:avLst/>
+          </a:prstGeom>
+        </p:spPr>
+        <p:style>
+          <a:lnRef idx="2">
+            <a:schemeClr val="accent1">
+              <a:shade val="50000"/>
+            </a:schemeClr>
+          </a:lnRef>
+          <a:fillRef idx="1">
+            <a:schemeClr val="accent1"/>
+          </a:fillRef>
+          <a:effectRef idx="0">
+            <a:schemeClr val="accent1"/>
+          </a:effectRef>
+          <a:fontRef idx="minor">
+            <a:schemeClr val="lt1"/>
+          </a:fontRef>
+        </p:style>
+        <p:txBody>
+          <a:bodyPr rtlCol="0" anchor="ctr"/>
+          <a:lstStyle/>
+          <a:p>
+            <a:pPr algn="ctr"/>
+            <a:endParaRPr lang="en-IN" dirty="0"/>
+          </a:p>
+        </p:txBody>
+      </p:sp>
     </p:spTree>
     <p:extLst>
       <p:ext uri="{BB962C8B-B14F-4D97-AF65-F5344CB8AC3E}">

</xml_diff>